<commit_message>
MOAR UPDATEZ to monolith
</commit_message>
<xml_diff>
--- a/Breaking the Monolith.pptx
+++ b/Breaking the Monolith.pptx
@@ -13,6 +13,13 @@
     <p:sldId id="260" r:id="rId7"/>
     <p:sldId id="261" r:id="rId8"/>
     <p:sldId id="262" r:id="rId9"/>
+    <p:sldId id="265" r:id="rId10"/>
+    <p:sldId id="269" r:id="rId11"/>
+    <p:sldId id="266" r:id="rId12"/>
+    <p:sldId id="264" r:id="rId13"/>
+    <p:sldId id="267" r:id="rId14"/>
+    <p:sldId id="268" r:id="rId15"/>
+    <p:sldId id="270" r:id="rId16"/>
   </p:sldIdLst>
   <p:sldSz cx="12192000" cy="6858000"/>
   <p:notesSz cx="6858000" cy="9144000"/>
@@ -5913,6 +5920,1272 @@
 </p:sld>
 </file>
 
+<file path=ppt/slides/slide10.xml><?xml version="1.0" encoding="utf-8"?>
+<p:sld xmlns:a="http://schemas.openxmlformats.org/drawingml/2006/main" xmlns:r="http://schemas.openxmlformats.org/officeDocument/2006/relationships" xmlns:p="http://schemas.openxmlformats.org/presentationml/2006/main">
+  <p:cSld>
+    <p:spTree>
+      <p:nvGrpSpPr>
+        <p:cNvPr id="1" name=""/>
+        <p:cNvGrpSpPr/>
+        <p:nvPr/>
+      </p:nvGrpSpPr>
+      <p:grpSpPr>
+        <a:xfrm>
+          <a:off x="0" y="0"/>
+          <a:ext cx="0" cy="0"/>
+          <a:chOff x="0" y="0"/>
+          <a:chExt cx="0" cy="0"/>
+        </a:xfrm>
+      </p:grpSpPr>
+      <p:sp>
+        <p:nvSpPr>
+          <p:cNvPr id="2" name="Title 1">
+            <a:extLst>
+              <a:ext uri="{FF2B5EF4-FFF2-40B4-BE49-F238E27FC236}">
+                <a16:creationId xmlns:a16="http://schemas.microsoft.com/office/drawing/2014/main" id="{0F8495C6-5E5A-40D0-8135-41BEB4D8C971}"/>
+              </a:ext>
+            </a:extLst>
+          </p:cNvPr>
+          <p:cNvSpPr>
+            <a:spLocks noGrp="1"/>
+          </p:cNvSpPr>
+          <p:nvPr>
+            <p:ph type="title"/>
+          </p:nvPr>
+        </p:nvSpPr>
+        <p:spPr/>
+        <p:txBody>
+          <a:bodyPr/>
+          <a:lstStyle/>
+          <a:p>
+            <a:r>
+              <a:rPr lang="en-US" dirty="0"/>
+              <a:t>Real-life examples</a:t>
+            </a:r>
+          </a:p>
+        </p:txBody>
+      </p:sp>
+      <p:sp>
+        <p:nvSpPr>
+          <p:cNvPr id="3" name="Content Placeholder 2">
+            <a:extLst>
+              <a:ext uri="{FF2B5EF4-FFF2-40B4-BE49-F238E27FC236}">
+                <a16:creationId xmlns:a16="http://schemas.microsoft.com/office/drawing/2014/main" id="{29EB3280-46A8-40F9-91C9-9126DDDFD3D1}"/>
+              </a:ext>
+            </a:extLst>
+          </p:cNvPr>
+          <p:cNvSpPr>
+            <a:spLocks noGrp="1"/>
+          </p:cNvSpPr>
+          <p:nvPr>
+            <p:ph idx="1"/>
+          </p:nvPr>
+        </p:nvSpPr>
+        <p:spPr/>
+        <p:txBody>
+          <a:bodyPr/>
+          <a:lstStyle/>
+          <a:p>
+            <a:r>
+              <a:rPr lang="en-US" dirty="0"/>
+              <a:t>Image manipulation</a:t>
+            </a:r>
+          </a:p>
+          <a:p>
+            <a:r>
+              <a:rPr lang="en-US" dirty="0"/>
+              <a:t>Synchronizing with a third-party service (email lists!)</a:t>
+            </a:r>
+          </a:p>
+          <a:p>
+            <a:r>
+              <a:rPr lang="en-US" dirty="0"/>
+              <a:t>Batch processing of data</a:t>
+            </a:r>
+          </a:p>
+          <a:p>
+            <a:r>
+              <a:rPr lang="en-US" dirty="0"/>
+              <a:t>Scheduled events (monthly billing)</a:t>
+            </a:r>
+          </a:p>
+          <a:p>
+            <a:r>
+              <a:rPr lang="en-US" dirty="0"/>
+              <a:t>Sending email</a:t>
+            </a:r>
+          </a:p>
+        </p:txBody>
+      </p:sp>
+    </p:spTree>
+    <p:extLst>
+      <p:ext uri="{BB962C8B-B14F-4D97-AF65-F5344CB8AC3E}">
+        <p14:creationId xmlns:p14="http://schemas.microsoft.com/office/powerpoint/2010/main" val="3843734552"/>
+      </p:ext>
+    </p:extLst>
+  </p:cSld>
+  <p:clrMapOvr>
+    <a:masterClrMapping/>
+  </p:clrMapOvr>
+</p:sld>
+</file>
+
+<file path=ppt/slides/slide11.xml><?xml version="1.0" encoding="utf-8"?>
+<p:sld xmlns:a="http://schemas.openxmlformats.org/drawingml/2006/main" xmlns:r="http://schemas.openxmlformats.org/officeDocument/2006/relationships" xmlns:p="http://schemas.openxmlformats.org/presentationml/2006/main">
+  <p:cSld>
+    <p:spTree>
+      <p:nvGrpSpPr>
+        <p:cNvPr id="1" name=""/>
+        <p:cNvGrpSpPr/>
+        <p:nvPr/>
+      </p:nvGrpSpPr>
+      <p:grpSpPr>
+        <a:xfrm>
+          <a:off x="0" y="0"/>
+          <a:ext cx="0" cy="0"/>
+          <a:chOff x="0" y="0"/>
+          <a:chExt cx="0" cy="0"/>
+        </a:xfrm>
+      </p:grpSpPr>
+      <p:sp>
+        <p:nvSpPr>
+          <p:cNvPr id="2" name="Title 1">
+            <a:extLst>
+              <a:ext uri="{FF2B5EF4-FFF2-40B4-BE49-F238E27FC236}">
+                <a16:creationId xmlns:a16="http://schemas.microsoft.com/office/drawing/2014/main" id="{A6B61EA0-C567-41E3-8992-CF0452376EB8}"/>
+              </a:ext>
+            </a:extLst>
+          </p:cNvPr>
+          <p:cNvSpPr>
+            <a:spLocks noGrp="1"/>
+          </p:cNvSpPr>
+          <p:nvPr>
+            <p:ph type="title"/>
+          </p:nvPr>
+        </p:nvSpPr>
+        <p:spPr/>
+        <p:txBody>
+          <a:bodyPr/>
+          <a:lstStyle/>
+          <a:p>
+            <a:r>
+              <a:rPr lang="en-US" dirty="0"/>
+              <a:t>Most important rule of cloud:</a:t>
+            </a:r>
+          </a:p>
+        </p:txBody>
+      </p:sp>
+      <p:sp>
+        <p:nvSpPr>
+          <p:cNvPr id="3" name="Content Placeholder 2">
+            <a:extLst>
+              <a:ext uri="{FF2B5EF4-FFF2-40B4-BE49-F238E27FC236}">
+                <a16:creationId xmlns:a16="http://schemas.microsoft.com/office/drawing/2014/main" id="{55EFBDA4-2E63-4715-8A33-8E3137EC3C1D}"/>
+              </a:ext>
+            </a:extLst>
+          </p:cNvPr>
+          <p:cNvSpPr>
+            <a:spLocks noGrp="1"/>
+          </p:cNvSpPr>
+          <p:nvPr>
+            <p:ph idx="1"/>
+          </p:nvPr>
+        </p:nvSpPr>
+        <p:spPr>
+          <a:xfrm>
+            <a:off x="1120000" y="1497563"/>
+            <a:ext cx="10233800" cy="4926564"/>
+          </a:xfrm>
+        </p:spPr>
+        <p:txBody>
+          <a:bodyPr>
+            <a:normAutofit lnSpcReduction="10000"/>
+          </a:bodyPr>
+          <a:lstStyle/>
+          <a:p>
+            <a:pPr marL="0" indent="0" algn="ctr">
+              <a:buNone/>
+            </a:pPr>
+            <a:r>
+              <a:rPr lang="en-US" sz="5400" dirty="0"/>
+              <a:t>Every instance of computing stuff is intended to be thrown away.</a:t>
+            </a:r>
+          </a:p>
+          <a:p>
+            <a:r>
+              <a:rPr lang="en-US" dirty="0"/>
+              <a:t>You can’t store durable files on it.</a:t>
+            </a:r>
+          </a:p>
+          <a:p>
+            <a:r>
+              <a:rPr lang="en-US" dirty="0"/>
+              <a:t>You can’t store state on it, especially in memory.</a:t>
+            </a:r>
+          </a:p>
+          <a:p>
+            <a:r>
+              <a:rPr lang="en-US" dirty="0"/>
+              <a:t>You never know when the actual instance of the software will disappear.</a:t>
+            </a:r>
+          </a:p>
+          <a:p>
+            <a:r>
+              <a:rPr lang="en-US" dirty="0"/>
+              <a:t>You don’t even know if the underlying hardware will be around much longer.</a:t>
+            </a:r>
+          </a:p>
+          <a:p>
+            <a:r>
+              <a:rPr lang="en-US" dirty="0"/>
+              <a:t>When you run on multiple instances, they don’t usually know about each other.</a:t>
+            </a:r>
+          </a:p>
+        </p:txBody>
+      </p:sp>
+    </p:spTree>
+    <p:extLst>
+      <p:ext uri="{BB962C8B-B14F-4D97-AF65-F5344CB8AC3E}">
+        <p14:creationId xmlns:p14="http://schemas.microsoft.com/office/powerpoint/2010/main" val="4294511128"/>
+      </p:ext>
+    </p:extLst>
+  </p:cSld>
+  <p:clrMapOvr>
+    <a:masterClrMapping/>
+  </p:clrMapOvr>
+</p:sld>
+</file>
+
+<file path=ppt/slides/slide12.xml><?xml version="1.0" encoding="utf-8"?>
+<p:sld xmlns:a="http://schemas.openxmlformats.org/drawingml/2006/main" xmlns:r="http://schemas.openxmlformats.org/officeDocument/2006/relationships" xmlns:p="http://schemas.openxmlformats.org/presentationml/2006/main">
+  <p:cSld>
+    <p:spTree>
+      <p:nvGrpSpPr>
+        <p:cNvPr id="1" name=""/>
+        <p:cNvGrpSpPr/>
+        <p:nvPr/>
+      </p:nvGrpSpPr>
+      <p:grpSpPr>
+        <a:xfrm>
+          <a:off x="0" y="0"/>
+          <a:ext cx="0" cy="0"/>
+          <a:chOff x="0" y="0"/>
+          <a:chExt cx="0" cy="0"/>
+        </a:xfrm>
+      </p:grpSpPr>
+      <p:sp>
+        <p:nvSpPr>
+          <p:cNvPr id="2" name="Title 1">
+            <a:extLst>
+              <a:ext uri="{FF2B5EF4-FFF2-40B4-BE49-F238E27FC236}">
+                <a16:creationId xmlns:a16="http://schemas.microsoft.com/office/drawing/2014/main" id="{C2E4FC0D-AA58-496E-85AB-68267642A03C}"/>
+              </a:ext>
+            </a:extLst>
+          </p:cNvPr>
+          <p:cNvSpPr>
+            <a:spLocks noGrp="1"/>
+          </p:cNvSpPr>
+          <p:nvPr>
+            <p:ph type="title"/>
+          </p:nvPr>
+        </p:nvSpPr>
+        <p:spPr/>
+        <p:txBody>
+          <a:bodyPr/>
+          <a:lstStyle/>
+          <a:p>
+            <a:r>
+              <a:rPr lang="en-US" dirty="0"/>
+              <a:t>Basic architecture</a:t>
+            </a:r>
+          </a:p>
+        </p:txBody>
+      </p:sp>
+      <p:sp>
+        <p:nvSpPr>
+          <p:cNvPr id="4" name="Rectangle 3">
+            <a:extLst>
+              <a:ext uri="{FF2B5EF4-FFF2-40B4-BE49-F238E27FC236}">
+                <a16:creationId xmlns:a16="http://schemas.microsoft.com/office/drawing/2014/main" id="{C211BFD4-A873-4E18-A174-67A18F822122}"/>
+              </a:ext>
+            </a:extLst>
+          </p:cNvPr>
+          <p:cNvSpPr/>
+          <p:nvPr/>
+        </p:nvSpPr>
+        <p:spPr>
+          <a:xfrm>
+            <a:off x="838200" y="1646853"/>
+            <a:ext cx="10694437" cy="4688633"/>
+          </a:xfrm>
+          <a:prstGeom prst="rect">
+            <a:avLst/>
+          </a:prstGeom>
+          <a:noFill/>
+        </p:spPr>
+        <p:style>
+          <a:lnRef idx="2">
+            <a:schemeClr val="accent1">
+              <a:shade val="50000"/>
+            </a:schemeClr>
+          </a:lnRef>
+          <a:fillRef idx="1">
+            <a:schemeClr val="accent1"/>
+          </a:fillRef>
+          <a:effectRef idx="0">
+            <a:schemeClr val="accent1"/>
+          </a:effectRef>
+          <a:fontRef idx="minor">
+            <a:schemeClr val="lt1"/>
+          </a:fontRef>
+        </p:style>
+        <p:txBody>
+          <a:bodyPr rtlCol="0" anchor="ctr"/>
+          <a:lstStyle/>
+          <a:p>
+            <a:pPr algn="ctr"/>
+            <a:endParaRPr lang="en-US"/>
+          </a:p>
+        </p:txBody>
+      </p:sp>
+      <p:sp>
+        <p:nvSpPr>
+          <p:cNvPr id="5" name="Rectangle 4">
+            <a:extLst>
+              <a:ext uri="{FF2B5EF4-FFF2-40B4-BE49-F238E27FC236}">
+                <a16:creationId xmlns:a16="http://schemas.microsoft.com/office/drawing/2014/main" id="{89805136-13F5-4CB2-8433-CA6839BB1403}"/>
+              </a:ext>
+            </a:extLst>
+          </p:cNvPr>
+          <p:cNvSpPr/>
+          <p:nvPr/>
+        </p:nvSpPr>
+        <p:spPr>
+          <a:xfrm>
+            <a:off x="1385595" y="2390661"/>
+            <a:ext cx="1478902" cy="1003041"/>
+          </a:xfrm>
+          <a:prstGeom prst="rect">
+            <a:avLst/>
+          </a:prstGeom>
+        </p:spPr>
+        <p:style>
+          <a:lnRef idx="2">
+            <a:schemeClr val="accent1">
+              <a:shade val="50000"/>
+            </a:schemeClr>
+          </a:lnRef>
+          <a:fillRef idx="1">
+            <a:schemeClr val="accent1"/>
+          </a:fillRef>
+          <a:effectRef idx="0">
+            <a:schemeClr val="accent1"/>
+          </a:effectRef>
+          <a:fontRef idx="minor">
+            <a:schemeClr val="lt1"/>
+          </a:fontRef>
+        </p:style>
+        <p:txBody>
+          <a:bodyPr rtlCol="0" anchor="ctr"/>
+          <a:lstStyle/>
+          <a:p>
+            <a:pPr algn="ctr"/>
+            <a:r>
+              <a:rPr lang="en-US" dirty="0"/>
+              <a:t>UI</a:t>
+            </a:r>
+          </a:p>
+          <a:p>
+            <a:pPr algn="ctr"/>
+            <a:r>
+              <a:rPr lang="en-US" dirty="0"/>
+              <a:t>(1..n)</a:t>
+            </a:r>
+          </a:p>
+        </p:txBody>
+      </p:sp>
+      <p:sp>
+        <p:nvSpPr>
+          <p:cNvPr id="6" name="Rectangle 5">
+            <a:extLst>
+              <a:ext uri="{FF2B5EF4-FFF2-40B4-BE49-F238E27FC236}">
+                <a16:creationId xmlns:a16="http://schemas.microsoft.com/office/drawing/2014/main" id="{FFEC4131-B71F-4F7A-9069-350EF833C054}"/>
+              </a:ext>
+            </a:extLst>
+          </p:cNvPr>
+          <p:cNvSpPr/>
+          <p:nvPr/>
+        </p:nvSpPr>
+        <p:spPr>
+          <a:xfrm>
+            <a:off x="1385595" y="4402818"/>
+            <a:ext cx="1478902" cy="1003041"/>
+          </a:xfrm>
+          <a:prstGeom prst="rect">
+            <a:avLst/>
+          </a:prstGeom>
+        </p:spPr>
+        <p:style>
+          <a:lnRef idx="2">
+            <a:schemeClr val="accent1">
+              <a:shade val="50000"/>
+            </a:schemeClr>
+          </a:lnRef>
+          <a:fillRef idx="1">
+            <a:schemeClr val="accent1"/>
+          </a:fillRef>
+          <a:effectRef idx="0">
+            <a:schemeClr val="accent1"/>
+          </a:effectRef>
+          <a:fontRef idx="minor">
+            <a:schemeClr val="lt1"/>
+          </a:fontRef>
+        </p:style>
+        <p:txBody>
+          <a:bodyPr rtlCol="0" anchor="ctr"/>
+          <a:lstStyle/>
+          <a:p>
+            <a:pPr algn="ctr"/>
+            <a:r>
+              <a:rPr lang="en-US" dirty="0"/>
+              <a:t>Chron</a:t>
+            </a:r>
+          </a:p>
+        </p:txBody>
+      </p:sp>
+      <p:sp>
+        <p:nvSpPr>
+          <p:cNvPr id="7" name="Rectangle 6">
+            <a:extLst>
+              <a:ext uri="{FF2B5EF4-FFF2-40B4-BE49-F238E27FC236}">
+                <a16:creationId xmlns:a16="http://schemas.microsoft.com/office/drawing/2014/main" id="{96161F89-C35D-44AC-9190-7EDE8089A8F5}"/>
+              </a:ext>
+            </a:extLst>
+          </p:cNvPr>
+          <p:cNvSpPr/>
+          <p:nvPr/>
+        </p:nvSpPr>
+        <p:spPr>
+          <a:xfrm>
+            <a:off x="3708918" y="3399777"/>
+            <a:ext cx="1478902" cy="1003041"/>
+          </a:xfrm>
+          <a:prstGeom prst="rect">
+            <a:avLst/>
+          </a:prstGeom>
+        </p:spPr>
+        <p:style>
+          <a:lnRef idx="2">
+            <a:schemeClr val="accent1">
+              <a:shade val="50000"/>
+            </a:schemeClr>
+          </a:lnRef>
+          <a:fillRef idx="1">
+            <a:schemeClr val="accent1"/>
+          </a:fillRef>
+          <a:effectRef idx="0">
+            <a:schemeClr val="accent1"/>
+          </a:effectRef>
+          <a:fontRef idx="minor">
+            <a:schemeClr val="lt1"/>
+          </a:fontRef>
+        </p:style>
+        <p:txBody>
+          <a:bodyPr rtlCol="0" anchor="ctr"/>
+          <a:lstStyle/>
+          <a:p>
+            <a:pPr algn="ctr"/>
+            <a:r>
+              <a:rPr lang="en-US" dirty="0"/>
+              <a:t>Queue</a:t>
+            </a:r>
+          </a:p>
+        </p:txBody>
+      </p:sp>
+      <p:sp>
+        <p:nvSpPr>
+          <p:cNvPr id="8" name="Rectangle 7">
+            <a:extLst>
+              <a:ext uri="{FF2B5EF4-FFF2-40B4-BE49-F238E27FC236}">
+                <a16:creationId xmlns:a16="http://schemas.microsoft.com/office/drawing/2014/main" id="{9A09D080-E3AE-48FB-BF7C-EB41F7DC7237}"/>
+              </a:ext>
+            </a:extLst>
+          </p:cNvPr>
+          <p:cNvSpPr/>
+          <p:nvPr/>
+        </p:nvSpPr>
+        <p:spPr>
+          <a:xfrm>
+            <a:off x="6141876" y="3393702"/>
+            <a:ext cx="1478902" cy="1003041"/>
+          </a:xfrm>
+          <a:prstGeom prst="rect">
+            <a:avLst/>
+          </a:prstGeom>
+        </p:spPr>
+        <p:style>
+          <a:lnRef idx="2">
+            <a:schemeClr val="accent1">
+              <a:shade val="50000"/>
+            </a:schemeClr>
+          </a:lnRef>
+          <a:fillRef idx="1">
+            <a:schemeClr val="accent1"/>
+          </a:fillRef>
+          <a:effectRef idx="0">
+            <a:schemeClr val="accent1"/>
+          </a:effectRef>
+          <a:fontRef idx="minor">
+            <a:schemeClr val="lt1"/>
+          </a:fontRef>
+        </p:style>
+        <p:txBody>
+          <a:bodyPr rtlCol="0" anchor="ctr"/>
+          <a:lstStyle/>
+          <a:p>
+            <a:pPr algn="ctr"/>
+            <a:r>
+              <a:rPr lang="en-US" dirty="0"/>
+              <a:t>Task</a:t>
+            </a:r>
+          </a:p>
+          <a:p>
+            <a:pPr algn="ctr"/>
+            <a:r>
+              <a:rPr lang="en-US" dirty="0"/>
+              <a:t>Runner</a:t>
+            </a:r>
+            <a:br>
+              <a:rPr lang="en-US" dirty="0"/>
+            </a:br>
+            <a:r>
+              <a:rPr lang="en-US" dirty="0"/>
+              <a:t>(1..n)</a:t>
+            </a:r>
+          </a:p>
+        </p:txBody>
+      </p:sp>
+      <p:sp>
+        <p:nvSpPr>
+          <p:cNvPr id="9" name="Cylinder 8">
+            <a:extLst>
+              <a:ext uri="{FF2B5EF4-FFF2-40B4-BE49-F238E27FC236}">
+                <a16:creationId xmlns:a16="http://schemas.microsoft.com/office/drawing/2014/main" id="{78A14D56-F9C2-40E8-83BB-03D4A8C248D1}"/>
+              </a:ext>
+            </a:extLst>
+          </p:cNvPr>
+          <p:cNvSpPr/>
+          <p:nvPr/>
+        </p:nvSpPr>
+        <p:spPr>
+          <a:xfrm>
+            <a:off x="8570556" y="4396743"/>
+            <a:ext cx="2012302" cy="1052335"/>
+          </a:xfrm>
+          <a:prstGeom prst="can">
+            <a:avLst/>
+          </a:prstGeom>
+        </p:spPr>
+        <p:style>
+          <a:lnRef idx="2">
+            <a:schemeClr val="accent1">
+              <a:shade val="50000"/>
+            </a:schemeClr>
+          </a:lnRef>
+          <a:fillRef idx="1">
+            <a:schemeClr val="accent1"/>
+          </a:fillRef>
+          <a:effectRef idx="0">
+            <a:schemeClr val="accent1"/>
+          </a:effectRef>
+          <a:fontRef idx="minor">
+            <a:schemeClr val="lt1"/>
+          </a:fontRef>
+        </p:style>
+        <p:txBody>
+          <a:bodyPr rtlCol="0" anchor="ctr"/>
+          <a:lstStyle/>
+          <a:p>
+            <a:pPr algn="ctr"/>
+            <a:r>
+              <a:rPr lang="en-US" dirty="0"/>
+              <a:t>Database</a:t>
+            </a:r>
+          </a:p>
+        </p:txBody>
+      </p:sp>
+      <p:sp>
+        <p:nvSpPr>
+          <p:cNvPr id="10" name="Rectangle 9">
+            <a:extLst>
+              <a:ext uri="{FF2B5EF4-FFF2-40B4-BE49-F238E27FC236}">
+                <a16:creationId xmlns:a16="http://schemas.microsoft.com/office/drawing/2014/main" id="{D8CBD35D-5914-4888-B258-77EF2B547957}"/>
+              </a:ext>
+            </a:extLst>
+          </p:cNvPr>
+          <p:cNvSpPr/>
+          <p:nvPr/>
+        </p:nvSpPr>
+        <p:spPr>
+          <a:xfrm>
+            <a:off x="8570556" y="2527803"/>
+            <a:ext cx="2012302" cy="704461"/>
+          </a:xfrm>
+          <a:prstGeom prst="rect">
+            <a:avLst/>
+          </a:prstGeom>
+        </p:spPr>
+        <p:style>
+          <a:lnRef idx="2">
+            <a:schemeClr val="accent1">
+              <a:shade val="50000"/>
+            </a:schemeClr>
+          </a:lnRef>
+          <a:fillRef idx="1">
+            <a:schemeClr val="accent1"/>
+          </a:fillRef>
+          <a:effectRef idx="0">
+            <a:schemeClr val="accent1"/>
+          </a:effectRef>
+          <a:fontRef idx="minor">
+            <a:schemeClr val="lt1"/>
+          </a:fontRef>
+        </p:style>
+        <p:txBody>
+          <a:bodyPr rtlCol="0" anchor="ctr"/>
+          <a:lstStyle/>
+          <a:p>
+            <a:pPr algn="ctr"/>
+            <a:r>
+              <a:rPr lang="en-US" dirty="0"/>
+              <a:t>External Service</a:t>
+            </a:r>
+          </a:p>
+        </p:txBody>
+      </p:sp>
+      <p:cxnSp>
+        <p:nvCxnSpPr>
+          <p:cNvPr id="14" name="Connector: Elbow 13">
+            <a:extLst>
+              <a:ext uri="{FF2B5EF4-FFF2-40B4-BE49-F238E27FC236}">
+                <a16:creationId xmlns:a16="http://schemas.microsoft.com/office/drawing/2014/main" id="{79FA447E-B124-41EF-B995-615BCBD8F7A3}"/>
+              </a:ext>
+            </a:extLst>
+          </p:cNvPr>
+          <p:cNvCxnSpPr>
+            <a:stCxn id="7" idx="3"/>
+            <a:endCxn id="8" idx="1"/>
+          </p:cNvCxnSpPr>
+          <p:nvPr/>
+        </p:nvCxnSpPr>
+        <p:spPr>
+          <a:xfrm flipV="1">
+            <a:off x="5187820" y="3895223"/>
+            <a:ext cx="954056" cy="6075"/>
+          </a:xfrm>
+          <a:prstGeom prst="bentConnector3">
+            <a:avLst/>
+          </a:prstGeom>
+          <a:ln w="76200">
+            <a:tailEnd type="triangle"/>
+          </a:ln>
+        </p:spPr>
+        <p:style>
+          <a:lnRef idx="3">
+            <a:schemeClr val="accent5"/>
+          </a:lnRef>
+          <a:fillRef idx="0">
+            <a:schemeClr val="accent5"/>
+          </a:fillRef>
+          <a:effectRef idx="2">
+            <a:schemeClr val="accent5"/>
+          </a:effectRef>
+          <a:fontRef idx="minor">
+            <a:schemeClr val="tx1"/>
+          </a:fontRef>
+        </p:style>
+      </p:cxnSp>
+      <p:cxnSp>
+        <p:nvCxnSpPr>
+          <p:cNvPr id="16" name="Connector: Elbow 15">
+            <a:extLst>
+              <a:ext uri="{FF2B5EF4-FFF2-40B4-BE49-F238E27FC236}">
+                <a16:creationId xmlns:a16="http://schemas.microsoft.com/office/drawing/2014/main" id="{2124FF48-54C7-433F-9D24-0B0D089C55B7}"/>
+              </a:ext>
+            </a:extLst>
+          </p:cNvPr>
+          <p:cNvCxnSpPr>
+            <a:stCxn id="5" idx="3"/>
+            <a:endCxn id="7" idx="0"/>
+          </p:cNvCxnSpPr>
+          <p:nvPr/>
+        </p:nvCxnSpPr>
+        <p:spPr>
+          <a:xfrm>
+            <a:off x="2864497" y="2892182"/>
+            <a:ext cx="1583872" cy="507595"/>
+          </a:xfrm>
+          <a:prstGeom prst="bentConnector2">
+            <a:avLst/>
+          </a:prstGeom>
+          <a:ln w="76200">
+            <a:headEnd type="none" w="med" len="med"/>
+            <a:tailEnd type="triangle" w="med" len="med"/>
+          </a:ln>
+        </p:spPr>
+        <p:style>
+          <a:lnRef idx="3">
+            <a:schemeClr val="accent5"/>
+          </a:lnRef>
+          <a:fillRef idx="0">
+            <a:schemeClr val="accent5"/>
+          </a:fillRef>
+          <a:effectRef idx="2">
+            <a:schemeClr val="accent5"/>
+          </a:effectRef>
+          <a:fontRef idx="minor">
+            <a:schemeClr val="tx1"/>
+          </a:fontRef>
+        </p:style>
+      </p:cxnSp>
+      <p:cxnSp>
+        <p:nvCxnSpPr>
+          <p:cNvPr id="18" name="Connector: Elbow 17">
+            <a:extLst>
+              <a:ext uri="{FF2B5EF4-FFF2-40B4-BE49-F238E27FC236}">
+                <a16:creationId xmlns:a16="http://schemas.microsoft.com/office/drawing/2014/main" id="{03756BD4-5A05-4EA6-8251-BB424DAEA95A}"/>
+              </a:ext>
+            </a:extLst>
+          </p:cNvPr>
+          <p:cNvCxnSpPr>
+            <a:stCxn id="6" idx="3"/>
+            <a:endCxn id="7" idx="2"/>
+          </p:cNvCxnSpPr>
+          <p:nvPr/>
+        </p:nvCxnSpPr>
+        <p:spPr>
+          <a:xfrm flipV="1">
+            <a:off x="2864497" y="4402818"/>
+            <a:ext cx="1583872" cy="501521"/>
+          </a:xfrm>
+          <a:prstGeom prst="bentConnector2">
+            <a:avLst/>
+          </a:prstGeom>
+          <a:ln w="76200">
+            <a:headEnd type="none" w="med" len="med"/>
+            <a:tailEnd type="triangle" w="med" len="med"/>
+          </a:ln>
+        </p:spPr>
+        <p:style>
+          <a:lnRef idx="3">
+            <a:schemeClr val="accent5"/>
+          </a:lnRef>
+          <a:fillRef idx="0">
+            <a:schemeClr val="accent5"/>
+          </a:fillRef>
+          <a:effectRef idx="2">
+            <a:schemeClr val="accent5"/>
+          </a:effectRef>
+          <a:fontRef idx="minor">
+            <a:schemeClr val="tx1"/>
+          </a:fontRef>
+        </p:style>
+      </p:cxnSp>
+      <p:cxnSp>
+        <p:nvCxnSpPr>
+          <p:cNvPr id="20" name="Connector: Elbow 19">
+            <a:extLst>
+              <a:ext uri="{FF2B5EF4-FFF2-40B4-BE49-F238E27FC236}">
+                <a16:creationId xmlns:a16="http://schemas.microsoft.com/office/drawing/2014/main" id="{AE259596-AB6A-435E-BE6E-888F8695C00A}"/>
+              </a:ext>
+            </a:extLst>
+          </p:cNvPr>
+          <p:cNvCxnSpPr>
+            <a:stCxn id="8" idx="3"/>
+            <a:endCxn id="10" idx="2"/>
+          </p:cNvCxnSpPr>
+          <p:nvPr/>
+        </p:nvCxnSpPr>
+        <p:spPr>
+          <a:xfrm flipV="1">
+            <a:off x="7620778" y="3232264"/>
+            <a:ext cx="1955929" cy="662959"/>
+          </a:xfrm>
+          <a:prstGeom prst="bentConnector2">
+            <a:avLst/>
+          </a:prstGeom>
+          <a:ln w="76200">
+            <a:headEnd type="triangle" w="med" len="med"/>
+            <a:tailEnd type="triangle" w="med" len="med"/>
+          </a:ln>
+        </p:spPr>
+        <p:style>
+          <a:lnRef idx="3">
+            <a:schemeClr val="accent5"/>
+          </a:lnRef>
+          <a:fillRef idx="0">
+            <a:schemeClr val="accent5"/>
+          </a:fillRef>
+          <a:effectRef idx="2">
+            <a:schemeClr val="accent5"/>
+          </a:effectRef>
+          <a:fontRef idx="minor">
+            <a:schemeClr val="tx1"/>
+          </a:fontRef>
+        </p:style>
+      </p:cxnSp>
+      <p:cxnSp>
+        <p:nvCxnSpPr>
+          <p:cNvPr id="22" name="Connector: Elbow 21">
+            <a:extLst>
+              <a:ext uri="{FF2B5EF4-FFF2-40B4-BE49-F238E27FC236}">
+                <a16:creationId xmlns:a16="http://schemas.microsoft.com/office/drawing/2014/main" id="{B7793F3E-6A08-4A35-83C8-94ED49C1D65D}"/>
+              </a:ext>
+            </a:extLst>
+          </p:cNvPr>
+          <p:cNvCxnSpPr>
+            <a:stCxn id="8" idx="3"/>
+            <a:endCxn id="9" idx="1"/>
+          </p:cNvCxnSpPr>
+          <p:nvPr/>
+        </p:nvCxnSpPr>
+        <p:spPr>
+          <a:xfrm>
+            <a:off x="7620778" y="3895223"/>
+            <a:ext cx="1955929" cy="501520"/>
+          </a:xfrm>
+          <a:prstGeom prst="bentConnector2">
+            <a:avLst/>
+          </a:prstGeom>
+          <a:ln w="76200">
+            <a:headEnd type="triangle" w="med" len="med"/>
+            <a:tailEnd type="triangle" w="med" len="med"/>
+          </a:ln>
+        </p:spPr>
+        <p:style>
+          <a:lnRef idx="3">
+            <a:schemeClr val="accent5"/>
+          </a:lnRef>
+          <a:fillRef idx="0">
+            <a:schemeClr val="accent5"/>
+          </a:fillRef>
+          <a:effectRef idx="2">
+            <a:schemeClr val="accent5"/>
+          </a:effectRef>
+          <a:fontRef idx="minor">
+            <a:schemeClr val="tx1"/>
+          </a:fontRef>
+        </p:style>
+      </p:cxnSp>
+      <p:cxnSp>
+        <p:nvCxnSpPr>
+          <p:cNvPr id="24" name="Connector: Elbow 23">
+            <a:extLst>
+              <a:ext uri="{FF2B5EF4-FFF2-40B4-BE49-F238E27FC236}">
+                <a16:creationId xmlns:a16="http://schemas.microsoft.com/office/drawing/2014/main" id="{C74EA235-83DA-434F-9955-B1E9986A518B}"/>
+              </a:ext>
+            </a:extLst>
+          </p:cNvPr>
+          <p:cNvCxnSpPr>
+            <a:cxnSpLocks/>
+            <a:stCxn id="8" idx="0"/>
+            <a:endCxn id="5" idx="0"/>
+          </p:cNvCxnSpPr>
+          <p:nvPr/>
+        </p:nvCxnSpPr>
+        <p:spPr>
+          <a:xfrm rot="16200000" flipV="1">
+            <a:off x="4001667" y="514041"/>
+            <a:ext cx="1003041" cy="4756281"/>
+          </a:xfrm>
+          <a:prstGeom prst="bentConnector3">
+            <a:avLst>
+              <a:gd name="adj1" fmla="val 122791"/>
+            </a:avLst>
+          </a:prstGeom>
+          <a:ln w="76200">
+            <a:headEnd type="none" w="med" len="med"/>
+            <a:tailEnd type="triangle" w="med" len="med"/>
+          </a:ln>
+        </p:spPr>
+        <p:style>
+          <a:lnRef idx="3">
+            <a:schemeClr val="accent5"/>
+          </a:lnRef>
+          <a:fillRef idx="0">
+            <a:schemeClr val="accent5"/>
+          </a:fillRef>
+          <a:effectRef idx="2">
+            <a:schemeClr val="accent5"/>
+          </a:effectRef>
+          <a:fontRef idx="minor">
+            <a:schemeClr val="tx1"/>
+          </a:fontRef>
+        </p:style>
+      </p:cxnSp>
+    </p:spTree>
+    <p:extLst>
+      <p:ext uri="{BB962C8B-B14F-4D97-AF65-F5344CB8AC3E}">
+        <p14:creationId xmlns:p14="http://schemas.microsoft.com/office/powerpoint/2010/main" val="316294277"/>
+      </p:ext>
+    </p:extLst>
+  </p:cSld>
+  <p:clrMapOvr>
+    <a:masterClrMapping/>
+  </p:clrMapOvr>
+</p:sld>
+</file>
+
+<file path=ppt/slides/slide13.xml><?xml version="1.0" encoding="utf-8"?>
+<p:sld xmlns:a="http://schemas.openxmlformats.org/drawingml/2006/main" xmlns:r="http://schemas.openxmlformats.org/officeDocument/2006/relationships" xmlns:p="http://schemas.openxmlformats.org/presentationml/2006/main">
+  <p:cSld>
+    <p:spTree>
+      <p:nvGrpSpPr>
+        <p:cNvPr id="1" name=""/>
+        <p:cNvGrpSpPr/>
+        <p:nvPr/>
+      </p:nvGrpSpPr>
+      <p:grpSpPr>
+        <a:xfrm>
+          <a:off x="0" y="0"/>
+          <a:ext cx="0" cy="0"/>
+          <a:chOff x="0" y="0"/>
+          <a:chExt cx="0" cy="0"/>
+        </a:xfrm>
+      </p:grpSpPr>
+      <p:sp>
+        <p:nvSpPr>
+          <p:cNvPr id="2" name="Title 1">
+            <a:extLst>
+              <a:ext uri="{FF2B5EF4-FFF2-40B4-BE49-F238E27FC236}">
+                <a16:creationId xmlns:a16="http://schemas.microsoft.com/office/drawing/2014/main" id="{C5D5F58D-B5A1-4F37-89EC-E8D6087E18EF}"/>
+              </a:ext>
+            </a:extLst>
+          </p:cNvPr>
+          <p:cNvSpPr>
+            <a:spLocks noGrp="1"/>
+          </p:cNvSpPr>
+          <p:nvPr>
+            <p:ph type="title"/>
+          </p:nvPr>
+        </p:nvSpPr>
+        <p:spPr/>
+        <p:txBody>
+          <a:bodyPr/>
+          <a:lstStyle/>
+          <a:p>
+            <a:r>
+              <a:rPr lang="en-US" dirty="0"/>
+              <a:t>The Toolbox</a:t>
+            </a:r>
+          </a:p>
+        </p:txBody>
+      </p:sp>
+      <p:sp>
+        <p:nvSpPr>
+          <p:cNvPr id="3" name="Content Placeholder 2">
+            <a:extLst>
+              <a:ext uri="{FF2B5EF4-FFF2-40B4-BE49-F238E27FC236}">
+                <a16:creationId xmlns:a16="http://schemas.microsoft.com/office/drawing/2014/main" id="{ACD69307-2233-43C1-9DEF-A0760B7C310E}"/>
+              </a:ext>
+            </a:extLst>
+          </p:cNvPr>
+          <p:cNvSpPr>
+            <a:spLocks noGrp="1"/>
+          </p:cNvSpPr>
+          <p:nvPr>
+            <p:ph idx="1"/>
+          </p:nvPr>
+        </p:nvSpPr>
+        <p:spPr/>
+        <p:txBody>
+          <a:bodyPr/>
+          <a:lstStyle/>
+          <a:p>
+            <a:r>
+              <a:rPr lang="en-US" dirty="0"/>
+              <a:t>HTTP-serving web apps (VM’s, app services, web apps)</a:t>
+            </a:r>
+          </a:p>
+          <a:p>
+            <a:r>
+              <a:rPr lang="en-US" dirty="0"/>
+              <a:t>Transient storage: Queues</a:t>
+            </a:r>
+          </a:p>
+          <a:p>
+            <a:r>
+              <a:rPr lang="en-US" dirty="0"/>
+              <a:t>Durable or transient storage: Tables, blobs, doc </a:t>
+            </a:r>
+            <a:r>
+              <a:rPr lang="en-US" dirty="0" err="1"/>
+              <a:t>db’s</a:t>
+            </a:r>
+            <a:r>
+              <a:rPr lang="en-US" dirty="0"/>
+              <a:t>, etc.</a:t>
+            </a:r>
+          </a:p>
+          <a:p>
+            <a:r>
+              <a:rPr lang="en-US" dirty="0"/>
+              <a:t>“Serverless” compute (Functions, Lambdas; typically triggered by timers, HTTP hits, queues)</a:t>
+            </a:r>
+          </a:p>
+          <a:p>
+            <a:r>
+              <a:rPr lang="en-US" dirty="0"/>
+              <a:t>Databases</a:t>
+            </a:r>
+          </a:p>
+          <a:p>
+            <a:r>
+              <a:rPr lang="en-US" dirty="0"/>
+              <a:t>Memory caches (</a:t>
+            </a:r>
+            <a:r>
+              <a:rPr lang="en-US" dirty="0" err="1"/>
+              <a:t>Redis</a:t>
+            </a:r>
+            <a:r>
+              <a:rPr lang="en-US" dirty="0"/>
+              <a:t>, Memcached)</a:t>
+            </a:r>
+          </a:p>
+          <a:p>
+            <a:r>
+              <a:rPr lang="en-US" dirty="0"/>
+              <a:t>Service busses, messaging/signaling frameworks</a:t>
+            </a:r>
+          </a:p>
+        </p:txBody>
+      </p:sp>
+    </p:spTree>
+    <p:extLst>
+      <p:ext uri="{BB962C8B-B14F-4D97-AF65-F5344CB8AC3E}">
+        <p14:creationId xmlns:p14="http://schemas.microsoft.com/office/powerpoint/2010/main" val="3629627188"/>
+      </p:ext>
+    </p:extLst>
+  </p:cSld>
+  <p:clrMapOvr>
+    <a:masterClrMapping/>
+  </p:clrMapOvr>
+</p:sld>
+</file>
+
+<file path=ppt/slides/slide14.xml><?xml version="1.0" encoding="utf-8"?>
+<p:sld xmlns:a="http://schemas.openxmlformats.org/drawingml/2006/main" xmlns:r="http://schemas.openxmlformats.org/officeDocument/2006/relationships" xmlns:p="http://schemas.openxmlformats.org/presentationml/2006/main">
+  <p:cSld>
+    <p:spTree>
+      <p:nvGrpSpPr>
+        <p:cNvPr id="1" name=""/>
+        <p:cNvGrpSpPr/>
+        <p:nvPr/>
+      </p:nvGrpSpPr>
+      <p:grpSpPr>
+        <a:xfrm>
+          <a:off x="0" y="0"/>
+          <a:ext cx="0" cy="0"/>
+          <a:chOff x="0" y="0"/>
+          <a:chExt cx="0" cy="0"/>
+        </a:xfrm>
+      </p:grpSpPr>
+      <p:pic>
+        <p:nvPicPr>
+          <p:cNvPr id="3074" name="Picture 2" descr="https://i.imgflip.com/26hr5u.jpg">
+            <a:extLst>
+              <a:ext uri="{FF2B5EF4-FFF2-40B4-BE49-F238E27FC236}">
+                <a16:creationId xmlns:a16="http://schemas.microsoft.com/office/drawing/2014/main" id="{AC3C8C08-3881-47CC-AB78-2B620D11B233}"/>
+              </a:ext>
+            </a:extLst>
+          </p:cNvPr>
+          <p:cNvPicPr>
+            <a:picLocks noChangeAspect="1" noChangeArrowheads="1"/>
+          </p:cNvPicPr>
+          <p:nvPr/>
+        </p:nvPicPr>
+        <p:blipFill>
+          <a:blip r:embed="rId2">
+            <a:extLst>
+              <a:ext uri="{28A0092B-C50C-407E-A947-70E740481C1C}">
+                <a14:useLocalDpi xmlns:a14="http://schemas.microsoft.com/office/drawing/2010/main" val="0"/>
+              </a:ext>
+            </a:extLst>
+          </a:blip>
+          <a:srcRect/>
+          <a:stretch>
+            <a:fillRect/>
+          </a:stretch>
+        </p:blipFill>
+        <p:spPr bwMode="auto">
+          <a:xfrm>
+            <a:off x="1841372" y="408214"/>
+            <a:ext cx="8509256" cy="6041572"/>
+          </a:xfrm>
+          <a:prstGeom prst="rect">
+            <a:avLst/>
+          </a:prstGeom>
+          <a:noFill/>
+          <a:extLst>
+            <a:ext uri="{909E8E84-426E-40DD-AFC4-6F175D3DCCD1}">
+              <a14:hiddenFill xmlns:a14="http://schemas.microsoft.com/office/drawing/2010/main">
+                <a:solidFill>
+                  <a:srgbClr val="FFFFFF"/>
+                </a:solidFill>
+              </a14:hiddenFill>
+            </a:ext>
+          </a:extLst>
+        </p:spPr>
+      </p:pic>
+    </p:spTree>
+    <p:extLst>
+      <p:ext uri="{BB962C8B-B14F-4D97-AF65-F5344CB8AC3E}">
+        <p14:creationId xmlns:p14="http://schemas.microsoft.com/office/powerpoint/2010/main" val="1086352825"/>
+      </p:ext>
+    </p:extLst>
+  </p:cSld>
+  <p:clrMapOvr>
+    <a:masterClrMapping/>
+  </p:clrMapOvr>
+</p:sld>
+</file>
+
+<file path=ppt/slides/slide15.xml><?xml version="1.0" encoding="utf-8"?>
+<p:sld xmlns:a="http://schemas.openxmlformats.org/drawingml/2006/main" xmlns:r="http://schemas.openxmlformats.org/officeDocument/2006/relationships" xmlns:p="http://schemas.openxmlformats.org/presentationml/2006/main">
+  <p:cSld>
+    <p:spTree>
+      <p:nvGrpSpPr>
+        <p:cNvPr id="1" name=""/>
+        <p:cNvGrpSpPr/>
+        <p:nvPr/>
+      </p:nvGrpSpPr>
+      <p:grpSpPr>
+        <a:xfrm>
+          <a:off x="0" y="0"/>
+          <a:ext cx="0" cy="0"/>
+          <a:chOff x="0" y="0"/>
+          <a:chExt cx="0" cy="0"/>
+        </a:xfrm>
+      </p:grpSpPr>
+      <p:sp>
+        <p:nvSpPr>
+          <p:cNvPr id="2" name="Title 1">
+            <a:extLst>
+              <a:ext uri="{FF2B5EF4-FFF2-40B4-BE49-F238E27FC236}">
+                <a16:creationId xmlns:a16="http://schemas.microsoft.com/office/drawing/2014/main" id="{807A6A9B-76E8-4E54-B536-C074E7E2B0B5}"/>
+              </a:ext>
+            </a:extLst>
+          </p:cNvPr>
+          <p:cNvSpPr>
+            <a:spLocks noGrp="1"/>
+          </p:cNvSpPr>
+          <p:nvPr>
+            <p:ph type="title"/>
+          </p:nvPr>
+        </p:nvSpPr>
+        <p:spPr/>
+        <p:txBody>
+          <a:bodyPr/>
+          <a:lstStyle/>
+          <a:p>
+            <a:r>
+              <a:rPr lang="en-US" dirty="0"/>
+              <a:t>Questions?</a:t>
+            </a:r>
+          </a:p>
+        </p:txBody>
+      </p:sp>
+      <p:sp>
+        <p:nvSpPr>
+          <p:cNvPr id="3" name="Content Placeholder 2">
+            <a:extLst>
+              <a:ext uri="{FF2B5EF4-FFF2-40B4-BE49-F238E27FC236}">
+                <a16:creationId xmlns:a16="http://schemas.microsoft.com/office/drawing/2014/main" id="{7157458D-CC48-493B-9303-66A4B9CABE0A}"/>
+              </a:ext>
+            </a:extLst>
+          </p:cNvPr>
+          <p:cNvSpPr>
+            <a:spLocks noGrp="1"/>
+          </p:cNvSpPr>
+          <p:nvPr>
+            <p:ph idx="1"/>
+          </p:nvPr>
+        </p:nvSpPr>
+        <p:spPr/>
+        <p:txBody>
+          <a:bodyPr/>
+          <a:lstStyle/>
+          <a:p>
+            <a:r>
+              <a:rPr lang="en-US" dirty="0"/>
+              <a:t>jeff@popw.com</a:t>
+            </a:r>
+          </a:p>
+          <a:p>
+            <a:r>
+              <a:rPr lang="en-US" dirty="0"/>
+              <a:t>@</a:t>
+            </a:r>
+            <a:r>
+              <a:rPr lang="en-US" dirty="0" err="1"/>
+              <a:t>jeffputz</a:t>
+            </a:r>
+            <a:r>
+              <a:rPr lang="en-US" dirty="0"/>
+              <a:t> on the Twitter</a:t>
+            </a:r>
+          </a:p>
+          <a:p>
+            <a:r>
+              <a:rPr lang="en-US" dirty="0"/>
+              <a:t>https://github.com/jeffputz</a:t>
+            </a:r>
+          </a:p>
+          <a:p>
+            <a:r>
+              <a:rPr lang="en-US" dirty="0"/>
+              <a:t>https://jeffputz.com</a:t>
+            </a:r>
+          </a:p>
+          <a:p>
+            <a:r>
+              <a:rPr lang="en-US" dirty="0"/>
+              <a:t>@</a:t>
+            </a:r>
+            <a:r>
+              <a:rPr lang="en-US" dirty="0" err="1"/>
+              <a:t>jeff.putz</a:t>
+            </a:r>
+            <a:r>
+              <a:rPr lang="en-US" dirty="0"/>
+              <a:t> on the Instagram</a:t>
+            </a:r>
+          </a:p>
+          <a:p>
+            <a:endParaRPr lang="en-US" dirty="0"/>
+          </a:p>
+          <a:p>
+            <a:r>
+              <a:rPr lang="en-US" dirty="0"/>
+              <a:t>Remember: Mentor others, you were once a beginner too.</a:t>
+            </a:r>
+          </a:p>
+        </p:txBody>
+      </p:sp>
+    </p:spTree>
+    <p:extLst>
+      <p:ext uri="{BB962C8B-B14F-4D97-AF65-F5344CB8AC3E}">
+        <p14:creationId xmlns:p14="http://schemas.microsoft.com/office/powerpoint/2010/main" val="1865006764"/>
+      </p:ext>
+    </p:extLst>
+  </p:cSld>
+  <p:clrMapOvr>
+    <a:masterClrMapping/>
+  </p:clrMapOvr>
+</p:sld>
+</file>
+
 <file path=ppt/slides/slide2.xml><?xml version="1.0" encoding="utf-8"?>
 <p:sld xmlns:a="http://schemas.openxmlformats.org/drawingml/2006/main" xmlns:r="http://schemas.openxmlformats.org/officeDocument/2006/relationships" xmlns:p="http://schemas.openxmlformats.org/presentationml/2006/main">
   <p:cSld>
@@ -6820,6 +8093,12 @@
             <a:r>
               <a:rPr lang="en-US" dirty="0"/>
               <a:t>Might have shared state.</a:t>
+            </a:r>
+          </a:p>
+          <a:p>
+            <a:r>
+              <a:rPr lang="en-US" dirty="0"/>
+              <a:t>Performance is squishy.</a:t>
             </a:r>
           </a:p>
         </p:txBody>
@@ -7147,6 +8426,651 @@
                       </p:childTnLst>
                     </p:cTn>
                   </p:par>
+                  <p:par>
+                    <p:cTn id="28" fill="hold">
+                      <p:stCondLst>
+                        <p:cond delay="indefinite"/>
+                      </p:stCondLst>
+                      <p:childTnLst>
+                        <p:par>
+                          <p:cTn id="29" fill="hold">
+                            <p:stCondLst>
+                              <p:cond delay="0"/>
+                            </p:stCondLst>
+                            <p:childTnLst>
+                              <p:par>
+                                <p:cTn id="30" presetID="10" presetClass="entr" presetSubtype="0" fill="hold" grpId="0" nodeType="clickEffect">
+                                  <p:stCondLst>
+                                    <p:cond delay="0"/>
+                                  </p:stCondLst>
+                                  <p:childTnLst>
+                                    <p:set>
+                                      <p:cBhvr>
+                                        <p:cTn id="31" dur="1" fill="hold">
+                                          <p:stCondLst>
+                                            <p:cond delay="0"/>
+                                          </p:stCondLst>
+                                        </p:cTn>
+                                        <p:tgtEl>
+                                          <p:spTgt spid="3">
+                                            <p:txEl>
+                                              <p:pRg st="5" end="5"/>
+                                            </p:txEl>
+                                          </p:spTgt>
+                                        </p:tgtEl>
+                                        <p:attrNameLst>
+                                          <p:attrName>style.visibility</p:attrName>
+                                        </p:attrNameLst>
+                                      </p:cBhvr>
+                                      <p:to>
+                                        <p:strVal val="visible"/>
+                                      </p:to>
+                                    </p:set>
+                                    <p:animEffect transition="in" filter="fade">
+                                      <p:cBhvr>
+                                        <p:cTn id="32" dur="500"/>
+                                        <p:tgtEl>
+                                          <p:spTgt spid="3">
+                                            <p:txEl>
+                                              <p:pRg st="5" end="5"/>
+                                            </p:txEl>
+                                          </p:spTgt>
+                                        </p:tgtEl>
+                                      </p:cBhvr>
+                                    </p:animEffect>
+                                  </p:childTnLst>
+                                </p:cTn>
+                              </p:par>
+                            </p:childTnLst>
+                          </p:cTn>
+                        </p:par>
+                      </p:childTnLst>
+                    </p:cTn>
+                  </p:par>
+                </p:childTnLst>
+              </p:cTn>
+              <p:prevCondLst>
+                <p:cond evt="onPrev" delay="0">
+                  <p:tgtEl>
+                    <p:sldTgt/>
+                  </p:tgtEl>
+                </p:cond>
+              </p:prevCondLst>
+              <p:nextCondLst>
+                <p:cond evt="onNext" delay="0">
+                  <p:tgtEl>
+                    <p:sldTgt/>
+                  </p:tgtEl>
+                </p:cond>
+              </p:nextCondLst>
+            </p:seq>
+          </p:childTnLst>
+        </p:cTn>
+      </p:par>
+    </p:tnLst>
+    <p:bldLst>
+      <p:bldP spid="3" grpId="0" build="p"/>
+    </p:bldLst>
+  </p:timing>
+</p:sld>
+</file>
+
+<file path=ppt/slides/slide9.xml><?xml version="1.0" encoding="utf-8"?>
+<p:sld xmlns:a="http://schemas.openxmlformats.org/drawingml/2006/main" xmlns:r="http://schemas.openxmlformats.org/officeDocument/2006/relationships" xmlns:p="http://schemas.openxmlformats.org/presentationml/2006/main">
+  <p:cSld>
+    <p:spTree>
+      <p:nvGrpSpPr>
+        <p:cNvPr id="1" name=""/>
+        <p:cNvGrpSpPr/>
+        <p:nvPr/>
+      </p:nvGrpSpPr>
+      <p:grpSpPr>
+        <a:xfrm>
+          <a:off x="0" y="0"/>
+          <a:ext cx="0" cy="0"/>
+          <a:chOff x="0" y="0"/>
+          <a:chExt cx="0" cy="0"/>
+        </a:xfrm>
+      </p:grpSpPr>
+      <p:sp>
+        <p:nvSpPr>
+          <p:cNvPr id="2" name="Title 1">
+            <a:extLst>
+              <a:ext uri="{FF2B5EF4-FFF2-40B4-BE49-F238E27FC236}">
+                <a16:creationId xmlns:a16="http://schemas.microsoft.com/office/drawing/2014/main" id="{E08A18D2-11FA-4EE4-A8FE-5FCDE7BBE3C4}"/>
+              </a:ext>
+            </a:extLst>
+          </p:cNvPr>
+          <p:cNvSpPr>
+            <a:spLocks noGrp="1"/>
+          </p:cNvSpPr>
+          <p:nvPr>
+            <p:ph type="title"/>
+          </p:nvPr>
+        </p:nvSpPr>
+        <p:spPr/>
+        <p:txBody>
+          <a:bodyPr/>
+          <a:lstStyle/>
+          <a:p>
+            <a:r>
+              <a:rPr lang="en-US" dirty="0"/>
+              <a:t>Why do you need to split stuff up?</a:t>
+            </a:r>
+          </a:p>
+        </p:txBody>
+      </p:sp>
+      <p:sp>
+        <p:nvSpPr>
+          <p:cNvPr id="3" name="Content Placeholder 2">
+            <a:extLst>
+              <a:ext uri="{FF2B5EF4-FFF2-40B4-BE49-F238E27FC236}">
+                <a16:creationId xmlns:a16="http://schemas.microsoft.com/office/drawing/2014/main" id="{2206C92B-9D59-434A-8FEC-BE740CE3C063}"/>
+              </a:ext>
+            </a:extLst>
+          </p:cNvPr>
+          <p:cNvSpPr>
+            <a:spLocks noGrp="1"/>
+          </p:cNvSpPr>
+          <p:nvPr>
+            <p:ph idx="1"/>
+          </p:nvPr>
+        </p:nvSpPr>
+        <p:spPr/>
+        <p:txBody>
+          <a:bodyPr>
+            <a:normAutofit fontScale="92500" lnSpcReduction="20000"/>
+          </a:bodyPr>
+          <a:lstStyle/>
+          <a:p>
+            <a:r>
+              <a:rPr lang="en-US" dirty="0"/>
+              <a:t>Running in the web context sucks for a hundred different reasons (starting with using resources meant to serve the UI).</a:t>
+            </a:r>
+          </a:p>
+          <a:p>
+            <a:r>
+              <a:rPr lang="en-US" dirty="0"/>
+              <a:t>Some things take a long time, and the stateless nature of HTTP and the browser isn’t intended to deal with that.</a:t>
+            </a:r>
+          </a:p>
+          <a:p>
+            <a:r>
+              <a:rPr lang="en-US" dirty="0"/>
+              <a:t>Makes the UI seem more responsive.</a:t>
+            </a:r>
+          </a:p>
+          <a:p>
+            <a:r>
+              <a:rPr lang="en-US" dirty="0"/>
+              <a:t>Computationally expensive things could slow things down for all users, making your app unresponsive.</a:t>
+            </a:r>
+          </a:p>
+          <a:p>
+            <a:r>
+              <a:rPr lang="en-US" dirty="0"/>
+              <a:t>Stuff may need to run on a timer, and the timer doesn’t run when your inactive site gets turned off.</a:t>
+            </a:r>
+          </a:p>
+          <a:p>
+            <a:r>
+              <a:rPr lang="en-US" dirty="0"/>
+              <a:t>You want to make it easier to change little parts of your system independently of other parts.</a:t>
+            </a:r>
+          </a:p>
+          <a:p>
+            <a:r>
+              <a:rPr lang="en-US" dirty="0"/>
+              <a:t>Easier to scale when many instances can work on stuff.</a:t>
+            </a:r>
+          </a:p>
+        </p:txBody>
+      </p:sp>
+    </p:spTree>
+    <p:extLst>
+      <p:ext uri="{BB962C8B-B14F-4D97-AF65-F5344CB8AC3E}">
+        <p14:creationId xmlns:p14="http://schemas.microsoft.com/office/powerpoint/2010/main" val="2597604540"/>
+      </p:ext>
+    </p:extLst>
+  </p:cSld>
+  <p:clrMapOvr>
+    <a:masterClrMapping/>
+  </p:clrMapOvr>
+  <p:timing>
+    <p:tnLst>
+      <p:par>
+        <p:cTn id="1" dur="indefinite" restart="never" nodeType="tmRoot">
+          <p:childTnLst>
+            <p:seq concurrent="1" nextAc="seek">
+              <p:cTn id="2" dur="indefinite" nodeType="mainSeq">
+                <p:childTnLst>
+                  <p:par>
+                    <p:cTn id="3" fill="hold">
+                      <p:stCondLst>
+                        <p:cond delay="indefinite"/>
+                      </p:stCondLst>
+                      <p:childTnLst>
+                        <p:par>
+                          <p:cTn id="4" fill="hold">
+                            <p:stCondLst>
+                              <p:cond delay="0"/>
+                            </p:stCondLst>
+                            <p:childTnLst>
+                              <p:par>
+                                <p:cTn id="5" presetID="10" presetClass="entr" presetSubtype="0" fill="hold" grpId="0" nodeType="clickEffect">
+                                  <p:stCondLst>
+                                    <p:cond delay="0"/>
+                                  </p:stCondLst>
+                                  <p:childTnLst>
+                                    <p:set>
+                                      <p:cBhvr>
+                                        <p:cTn id="6" dur="1" fill="hold">
+                                          <p:stCondLst>
+                                            <p:cond delay="0"/>
+                                          </p:stCondLst>
+                                        </p:cTn>
+                                        <p:tgtEl>
+                                          <p:spTgt spid="3">
+                                            <p:txEl>
+                                              <p:pRg st="0" end="0"/>
+                                            </p:txEl>
+                                          </p:spTgt>
+                                        </p:tgtEl>
+                                        <p:attrNameLst>
+                                          <p:attrName>style.visibility</p:attrName>
+                                        </p:attrNameLst>
+                                      </p:cBhvr>
+                                      <p:to>
+                                        <p:strVal val="visible"/>
+                                      </p:to>
+                                    </p:set>
+                                    <p:animEffect transition="in" filter="fade">
+                                      <p:cBhvr>
+                                        <p:cTn id="7" dur="500"/>
+                                        <p:tgtEl>
+                                          <p:spTgt spid="3">
+                                            <p:txEl>
+                                              <p:pRg st="0" end="0"/>
+                                            </p:txEl>
+                                          </p:spTgt>
+                                        </p:tgtEl>
+                                      </p:cBhvr>
+                                    </p:animEffect>
+                                  </p:childTnLst>
+                                </p:cTn>
+                              </p:par>
+                            </p:childTnLst>
+                          </p:cTn>
+                        </p:par>
+                      </p:childTnLst>
+                    </p:cTn>
+                  </p:par>
+                  <p:par>
+                    <p:cTn id="8" fill="hold">
+                      <p:stCondLst>
+                        <p:cond delay="indefinite"/>
+                      </p:stCondLst>
+                      <p:childTnLst>
+                        <p:par>
+                          <p:cTn id="9" fill="hold">
+                            <p:stCondLst>
+                              <p:cond delay="0"/>
+                            </p:stCondLst>
+                            <p:childTnLst>
+                              <p:par>
+                                <p:cTn id="10" presetID="10" presetClass="entr" presetSubtype="0" fill="hold" grpId="0" nodeType="clickEffect">
+                                  <p:stCondLst>
+                                    <p:cond delay="0"/>
+                                  </p:stCondLst>
+                                  <p:childTnLst>
+                                    <p:set>
+                                      <p:cBhvr>
+                                        <p:cTn id="11" dur="1" fill="hold">
+                                          <p:stCondLst>
+                                            <p:cond delay="0"/>
+                                          </p:stCondLst>
+                                        </p:cTn>
+                                        <p:tgtEl>
+                                          <p:spTgt spid="3">
+                                            <p:txEl>
+                                              <p:pRg st="1" end="1"/>
+                                            </p:txEl>
+                                          </p:spTgt>
+                                        </p:tgtEl>
+                                        <p:attrNameLst>
+                                          <p:attrName>style.visibility</p:attrName>
+                                        </p:attrNameLst>
+                                      </p:cBhvr>
+                                      <p:to>
+                                        <p:strVal val="visible"/>
+                                      </p:to>
+                                    </p:set>
+                                    <p:animEffect transition="in" filter="fade">
+                                      <p:cBhvr>
+                                        <p:cTn id="12" dur="500"/>
+                                        <p:tgtEl>
+                                          <p:spTgt spid="3">
+                                            <p:txEl>
+                                              <p:pRg st="1" end="1"/>
+                                            </p:txEl>
+                                          </p:spTgt>
+                                        </p:tgtEl>
+                                      </p:cBhvr>
+                                    </p:animEffect>
+                                  </p:childTnLst>
+                                </p:cTn>
+                              </p:par>
+                            </p:childTnLst>
+                          </p:cTn>
+                        </p:par>
+                      </p:childTnLst>
+                    </p:cTn>
+                  </p:par>
+                  <p:par>
+                    <p:cTn id="13" fill="hold">
+                      <p:stCondLst>
+                        <p:cond delay="indefinite"/>
+                      </p:stCondLst>
+                      <p:childTnLst>
+                        <p:par>
+                          <p:cTn id="14" fill="hold">
+                            <p:stCondLst>
+                              <p:cond delay="0"/>
+                            </p:stCondLst>
+                            <p:childTnLst>
+                              <p:par>
+                                <p:cTn id="15" presetID="10" presetClass="entr" presetSubtype="0" fill="hold" grpId="0" nodeType="clickEffect">
+                                  <p:stCondLst>
+                                    <p:cond delay="0"/>
+                                  </p:stCondLst>
+                                  <p:childTnLst>
+                                    <p:set>
+                                      <p:cBhvr>
+                                        <p:cTn id="16" dur="1" fill="hold">
+                                          <p:stCondLst>
+                                            <p:cond delay="0"/>
+                                          </p:stCondLst>
+                                        </p:cTn>
+                                        <p:tgtEl>
+                                          <p:spTgt spid="3">
+                                            <p:txEl>
+                                              <p:pRg st="2" end="2"/>
+                                            </p:txEl>
+                                          </p:spTgt>
+                                        </p:tgtEl>
+                                        <p:attrNameLst>
+                                          <p:attrName>style.visibility</p:attrName>
+                                        </p:attrNameLst>
+                                      </p:cBhvr>
+                                      <p:to>
+                                        <p:strVal val="visible"/>
+                                      </p:to>
+                                    </p:set>
+                                    <p:animEffect transition="in" filter="fade">
+                                      <p:cBhvr>
+                                        <p:cTn id="17" dur="500"/>
+                                        <p:tgtEl>
+                                          <p:spTgt spid="3">
+                                            <p:txEl>
+                                              <p:pRg st="2" end="2"/>
+                                            </p:txEl>
+                                          </p:spTgt>
+                                        </p:tgtEl>
+                                      </p:cBhvr>
+                                    </p:animEffect>
+                                  </p:childTnLst>
+                                </p:cTn>
+                              </p:par>
+                            </p:childTnLst>
+                          </p:cTn>
+                        </p:par>
+                      </p:childTnLst>
+                    </p:cTn>
+                  </p:par>
+                  <p:par>
+                    <p:cTn id="18" fill="hold">
+                      <p:stCondLst>
+                        <p:cond delay="indefinite"/>
+                      </p:stCondLst>
+                      <p:childTnLst>
+                        <p:par>
+                          <p:cTn id="19" fill="hold">
+                            <p:stCondLst>
+                              <p:cond delay="0"/>
+                            </p:stCondLst>
+                            <p:childTnLst>
+                              <p:par>
+                                <p:cTn id="20" presetID="10" presetClass="entr" presetSubtype="0" fill="hold" grpId="0" nodeType="clickEffect">
+                                  <p:stCondLst>
+                                    <p:cond delay="0"/>
+                                  </p:stCondLst>
+                                  <p:childTnLst>
+                                    <p:set>
+                                      <p:cBhvr>
+                                        <p:cTn id="21" dur="1" fill="hold">
+                                          <p:stCondLst>
+                                            <p:cond delay="0"/>
+                                          </p:stCondLst>
+                                        </p:cTn>
+                                        <p:tgtEl>
+                                          <p:spTgt spid="3">
+                                            <p:txEl>
+                                              <p:pRg st="3" end="3"/>
+                                            </p:txEl>
+                                          </p:spTgt>
+                                        </p:tgtEl>
+                                        <p:attrNameLst>
+                                          <p:attrName>style.visibility</p:attrName>
+                                        </p:attrNameLst>
+                                      </p:cBhvr>
+                                      <p:to>
+                                        <p:strVal val="visible"/>
+                                      </p:to>
+                                    </p:set>
+                                    <p:animEffect transition="in" filter="fade">
+                                      <p:cBhvr>
+                                        <p:cTn id="22" dur="500"/>
+                                        <p:tgtEl>
+                                          <p:spTgt spid="3">
+                                            <p:txEl>
+                                              <p:pRg st="3" end="3"/>
+                                            </p:txEl>
+                                          </p:spTgt>
+                                        </p:tgtEl>
+                                      </p:cBhvr>
+                                    </p:animEffect>
+                                  </p:childTnLst>
+                                </p:cTn>
+                              </p:par>
+                            </p:childTnLst>
+                          </p:cTn>
+                        </p:par>
+                      </p:childTnLst>
+                    </p:cTn>
+                  </p:par>
+                  <p:par>
+                    <p:cTn id="23" fill="hold">
+                      <p:stCondLst>
+                        <p:cond delay="indefinite"/>
+                      </p:stCondLst>
+                      <p:childTnLst>
+                        <p:par>
+                          <p:cTn id="24" fill="hold">
+                            <p:stCondLst>
+                              <p:cond delay="0"/>
+                            </p:stCondLst>
+                            <p:childTnLst>
+                              <p:par>
+                                <p:cTn id="25" presetID="10" presetClass="entr" presetSubtype="0" fill="hold" grpId="0" nodeType="clickEffect">
+                                  <p:stCondLst>
+                                    <p:cond delay="0"/>
+                                  </p:stCondLst>
+                                  <p:childTnLst>
+                                    <p:set>
+                                      <p:cBhvr>
+                                        <p:cTn id="26" dur="1" fill="hold">
+                                          <p:stCondLst>
+                                            <p:cond delay="0"/>
+                                          </p:stCondLst>
+                                        </p:cTn>
+                                        <p:tgtEl>
+                                          <p:spTgt spid="3">
+                                            <p:txEl>
+                                              <p:pRg st="4" end="4"/>
+                                            </p:txEl>
+                                          </p:spTgt>
+                                        </p:tgtEl>
+                                        <p:attrNameLst>
+                                          <p:attrName>style.visibility</p:attrName>
+                                        </p:attrNameLst>
+                                      </p:cBhvr>
+                                      <p:to>
+                                        <p:strVal val="visible"/>
+                                      </p:to>
+                                    </p:set>
+                                    <p:animEffect transition="in" filter="fade">
+                                      <p:cBhvr>
+                                        <p:cTn id="27" dur="500"/>
+                                        <p:tgtEl>
+                                          <p:spTgt spid="3">
+                                            <p:txEl>
+                                              <p:pRg st="4" end="4"/>
+                                            </p:txEl>
+                                          </p:spTgt>
+                                        </p:tgtEl>
+                                      </p:cBhvr>
+                                    </p:animEffect>
+                                  </p:childTnLst>
+                                </p:cTn>
+                              </p:par>
+                            </p:childTnLst>
+                          </p:cTn>
+                        </p:par>
+                      </p:childTnLst>
+                    </p:cTn>
+                  </p:par>
+                  <p:par>
+                    <p:cTn id="28" fill="hold">
+                      <p:stCondLst>
+                        <p:cond delay="indefinite"/>
+                      </p:stCondLst>
+                      <p:childTnLst>
+                        <p:par>
+                          <p:cTn id="29" fill="hold">
+                            <p:stCondLst>
+                              <p:cond delay="0"/>
+                            </p:stCondLst>
+                            <p:childTnLst>
+                              <p:par>
+                                <p:cTn id="30" presetID="10" presetClass="entr" presetSubtype="0" fill="hold" grpId="0" nodeType="clickEffect">
+                                  <p:stCondLst>
+                                    <p:cond delay="0"/>
+                                  </p:stCondLst>
+                                  <p:childTnLst>
+                                    <p:set>
+                                      <p:cBhvr>
+                                        <p:cTn id="31" dur="1" fill="hold">
+                                          <p:stCondLst>
+                                            <p:cond delay="0"/>
+                                          </p:stCondLst>
+                                        </p:cTn>
+                                        <p:tgtEl>
+                                          <p:spTgt spid="3">
+                                            <p:txEl>
+                                              <p:pRg st="5" end="5"/>
+                                            </p:txEl>
+                                          </p:spTgt>
+                                        </p:tgtEl>
+                                        <p:attrNameLst>
+                                          <p:attrName>style.visibility</p:attrName>
+                                        </p:attrNameLst>
+                                      </p:cBhvr>
+                                      <p:to>
+                                        <p:strVal val="visible"/>
+                                      </p:to>
+                                    </p:set>
+                                    <p:animEffect transition="in" filter="fade">
+                                      <p:cBhvr>
+                                        <p:cTn id="32" dur="500"/>
+                                        <p:tgtEl>
+                                          <p:spTgt spid="3">
+                                            <p:txEl>
+                                              <p:pRg st="5" end="5"/>
+                                            </p:txEl>
+                                          </p:spTgt>
+                                        </p:tgtEl>
+                                      </p:cBhvr>
+                                    </p:animEffect>
+                                  </p:childTnLst>
+                                </p:cTn>
+                              </p:par>
+                            </p:childTnLst>
+                          </p:cTn>
+                        </p:par>
+                      </p:childTnLst>
+                    </p:cTn>
+                  </p:par>
+                  <p:par>
+                    <p:cTn id="33" fill="hold">
+                      <p:stCondLst>
+                        <p:cond delay="indefinite"/>
+                      </p:stCondLst>
+                      <p:childTnLst>
+                        <p:par>
+                          <p:cTn id="34" fill="hold">
+                            <p:stCondLst>
+                              <p:cond delay="0"/>
+                            </p:stCondLst>
+                            <p:childTnLst>
+                              <p:par>
+                                <p:cTn id="35" presetID="10" presetClass="entr" presetSubtype="0" fill="hold" grpId="0" nodeType="clickEffect">
+                                  <p:stCondLst>
+                                    <p:cond delay="0"/>
+                                  </p:stCondLst>
+                                  <p:childTnLst>
+                                    <p:set>
+                                      <p:cBhvr>
+                                        <p:cTn id="36" dur="1" fill="hold">
+                                          <p:stCondLst>
+                                            <p:cond delay="0"/>
+                                          </p:stCondLst>
+                                        </p:cTn>
+                                        <p:tgtEl>
+                                          <p:spTgt spid="3">
+                                            <p:txEl>
+                                              <p:pRg st="6" end="6"/>
+                                            </p:txEl>
+                                          </p:spTgt>
+                                        </p:tgtEl>
+                                        <p:attrNameLst>
+                                          <p:attrName>style.visibility</p:attrName>
+                                        </p:attrNameLst>
+                                      </p:cBhvr>
+                                      <p:to>
+                                        <p:strVal val="visible"/>
+                                      </p:to>
+                                    </p:set>
+                                    <p:animEffect transition="in" filter="fade">
+                                      <p:cBhvr>
+                                        <p:cTn id="37" dur="500"/>
+                                        <p:tgtEl>
+                                          <p:spTgt spid="3">
+                                            <p:txEl>
+                                              <p:pRg st="6" end="6"/>
+                                            </p:txEl>
+                                          </p:spTgt>
+                                        </p:tgtEl>
+                                      </p:cBhvr>
+                                    </p:animEffect>
+                                  </p:childTnLst>
+                                </p:cTn>
+                              </p:par>
+                            </p:childTnLst>
+                          </p:cTn>
+                        </p:par>
+                      </p:childTnLst>
+                    </p:cTn>
+                  </p:par>
                 </p:childTnLst>
               </p:cTn>
               <p:prevCondLst>

</xml_diff>